<commit_message>
Vortrag PPP erstellt und Paint Grafiken
</commit_message>
<xml_diff>
--- a/Vorträge/90secVortragFlorianSchierz.pptx
+++ b/Vorträge/90secVortragFlorianSchierz.pptx
@@ -216,7 +216,7 @@
           <a:p>
             <a:fld id="{6DB929B3-EDC4-4292-BA5A-2119A16C91BC}" type="datetimeFigureOut">
               <a:rPr lang="de-DE" smtClean="0"/>
-              <a:t>21.04.2022</a:t>
+              <a:t>12.05.2022</a:t>
             </a:fld>
             <a:endParaRPr lang="de-DE"/>
           </a:p>
@@ -4648,7 +4648,7 @@
           <a:p>
             <a:r>
               <a:rPr lang="de-DE" dirty="0"/>
-              <a:t>TU Bergakademie Freiberg | Vortragender: Florian Schierz| 2022</a:t>
+              <a:t>TU Bergakademie Freiberg | Vortragender: Florian Schierz | 2022</a:t>
             </a:r>
           </a:p>
         </p:txBody>
@@ -5059,7 +5059,7 @@
           <a:p>
             <a:r>
               <a:rPr lang="de-DE" dirty="0"/>
-              <a:t>TU Bergakademie Freiberg | Vortragender: Florian Schierz| 2022</a:t>
+              <a:t>TU Bergakademie Freiberg | Vortragender: Florian Schierz | 2022</a:t>
             </a:r>
           </a:p>
         </p:txBody>

</xml_diff>